<commit_message>
Added an image of the circuit schematic.
</commit_message>
<xml_diff>
--- a/schematic/schematic.pptx
+++ b/schematic/schematic.pptx
@@ -104,6 +104,11 @@
       </a:defRPr>
     </a:lvl9pPr>
   </p:defaultTextStyle>
+  <p:extLst>
+    <p:ext uri="{EFAFB233-063F-42B5-8137-9DF3F51BA10A}">
+      <p15:sldGuideLst xmlns:p15="http://schemas.microsoft.com/office/powerpoint/2012/main"/>
+    </p:ext>
+  </p:extLst>
 </p:presentation>
 </file>
 
@@ -5771,6 +5776,343 @@
           </a:fontRef>
         </p:style>
       </p:cxnSp>
+      <p:cxnSp>
+        <p:nvCxnSpPr>
+          <p:cNvPr id="3" name="Straight Arrow Connector 2">
+            <a:extLst>
+              <a:ext uri="{FF2B5EF4-FFF2-40B4-BE49-F238E27FC236}">
+                <a16:creationId xmlns:a16="http://schemas.microsoft.com/office/drawing/2014/main" id="{839D2A8A-52F9-A6B2-0A49-4BCED82AAD57}"/>
+              </a:ext>
+            </a:extLst>
+          </p:cNvPr>
+          <p:cNvCxnSpPr/>
+          <p:nvPr/>
+        </p:nvCxnSpPr>
+        <p:spPr>
+          <a:xfrm flipV="1">
+            <a:off x="4149929" y="2456097"/>
+            <a:ext cx="442452" cy="359381"/>
+          </a:xfrm>
+          <a:prstGeom prst="straightConnector1">
+            <a:avLst/>
+          </a:prstGeom>
+          <a:ln>
+            <a:solidFill>
+              <a:schemeClr val="tx1"/>
+            </a:solidFill>
+            <a:tailEnd type="triangle"/>
+          </a:ln>
+        </p:spPr>
+        <p:style>
+          <a:lnRef idx="2">
+            <a:schemeClr val="accent1"/>
+          </a:lnRef>
+          <a:fillRef idx="0">
+            <a:schemeClr val="accent1"/>
+          </a:fillRef>
+          <a:effectRef idx="1">
+            <a:schemeClr val="accent1"/>
+          </a:effectRef>
+          <a:fontRef idx="minor">
+            <a:schemeClr val="tx1"/>
+          </a:fontRef>
+        </p:style>
+      </p:cxnSp>
+      <p:cxnSp>
+        <p:nvCxnSpPr>
+          <p:cNvPr id="19" name="Straight Arrow Connector 18">
+            <a:extLst>
+              <a:ext uri="{FF2B5EF4-FFF2-40B4-BE49-F238E27FC236}">
+                <a16:creationId xmlns:a16="http://schemas.microsoft.com/office/drawing/2014/main" id="{5CE8F3B0-A94C-C4B0-ECF2-029858653AE5}"/>
+              </a:ext>
+            </a:extLst>
+          </p:cNvPr>
+          <p:cNvCxnSpPr/>
+          <p:nvPr/>
+        </p:nvCxnSpPr>
+        <p:spPr>
+          <a:xfrm flipV="1">
+            <a:off x="5079590" y="2041913"/>
+            <a:ext cx="442452" cy="359381"/>
+          </a:xfrm>
+          <a:prstGeom prst="straightConnector1">
+            <a:avLst/>
+          </a:prstGeom>
+          <a:ln>
+            <a:solidFill>
+              <a:schemeClr val="tx1"/>
+            </a:solidFill>
+            <a:tailEnd type="triangle"/>
+          </a:ln>
+        </p:spPr>
+        <p:style>
+          <a:lnRef idx="2">
+            <a:schemeClr val="accent1"/>
+          </a:lnRef>
+          <a:fillRef idx="0">
+            <a:schemeClr val="accent1"/>
+          </a:fillRef>
+          <a:effectRef idx="1">
+            <a:schemeClr val="accent1"/>
+          </a:effectRef>
+          <a:fontRef idx="minor">
+            <a:schemeClr val="tx1"/>
+          </a:fontRef>
+        </p:style>
+      </p:cxnSp>
+      <p:sp>
+        <p:nvSpPr>
+          <p:cNvPr id="21" name="TextBox 20">
+            <a:extLst>
+              <a:ext uri="{FF2B5EF4-FFF2-40B4-BE49-F238E27FC236}">
+                <a16:creationId xmlns:a16="http://schemas.microsoft.com/office/drawing/2014/main" id="{AA90985D-2E25-5A60-BFC3-94E535522FC9}"/>
+              </a:ext>
+            </a:extLst>
+          </p:cNvPr>
+          <p:cNvSpPr txBox="1"/>
+          <p:nvPr/>
+        </p:nvSpPr>
+        <p:spPr>
+          <a:xfrm>
+            <a:off x="3990155" y="2145890"/>
+            <a:ext cx="646355" cy="369332"/>
+          </a:xfrm>
+          <a:prstGeom prst="rect">
+            <a:avLst/>
+          </a:prstGeom>
+          <a:noFill/>
+        </p:spPr>
+        <p:txBody>
+          <a:bodyPr wrap="square" rtlCol="0">
+            <a:spAutoFit/>
+          </a:bodyPr>
+          <a:lstStyle/>
+          <a:p>
+            <a:pPr algn="ctr"/>
+            <a:r>
+              <a:rPr lang="en-US" dirty="0"/>
+              <a:t>R1</a:t>
+            </a:r>
+          </a:p>
+        </p:txBody>
+      </p:sp>
+      <p:sp>
+        <p:nvSpPr>
+          <p:cNvPr id="25" name="TextBox 24">
+            <a:extLst>
+              <a:ext uri="{FF2B5EF4-FFF2-40B4-BE49-F238E27FC236}">
+                <a16:creationId xmlns:a16="http://schemas.microsoft.com/office/drawing/2014/main" id="{273C442A-402E-CF34-BC6E-C8E053499900}"/>
+              </a:ext>
+            </a:extLst>
+          </p:cNvPr>
+          <p:cNvSpPr txBox="1"/>
+          <p:nvPr/>
+        </p:nvSpPr>
+        <p:spPr>
+          <a:xfrm>
+            <a:off x="4992371" y="1835863"/>
+            <a:ext cx="646355" cy="369332"/>
+          </a:xfrm>
+          <a:prstGeom prst="rect">
+            <a:avLst/>
+          </a:prstGeom>
+          <a:noFill/>
+        </p:spPr>
+        <p:txBody>
+          <a:bodyPr wrap="square" rtlCol="0">
+            <a:spAutoFit/>
+          </a:bodyPr>
+          <a:lstStyle/>
+          <a:p>
+            <a:pPr algn="ctr"/>
+            <a:r>
+              <a:rPr lang="en-US" dirty="0"/>
+              <a:t>R2</a:t>
+            </a:r>
+          </a:p>
+        </p:txBody>
+      </p:sp>
+      <p:sp>
+        <p:nvSpPr>
+          <p:cNvPr id="27" name="TextBox 26">
+            <a:extLst>
+              <a:ext uri="{FF2B5EF4-FFF2-40B4-BE49-F238E27FC236}">
+                <a16:creationId xmlns:a16="http://schemas.microsoft.com/office/drawing/2014/main" id="{B94C62CE-89BD-4324-0687-56863A44ED4A}"/>
+              </a:ext>
+            </a:extLst>
+          </p:cNvPr>
+          <p:cNvSpPr txBox="1"/>
+          <p:nvPr/>
+        </p:nvSpPr>
+        <p:spPr>
+          <a:xfrm>
+            <a:off x="4992371" y="1178840"/>
+            <a:ext cx="646355" cy="369332"/>
+          </a:xfrm>
+          <a:prstGeom prst="rect">
+            <a:avLst/>
+          </a:prstGeom>
+          <a:noFill/>
+        </p:spPr>
+        <p:txBody>
+          <a:bodyPr wrap="square" rtlCol="0">
+            <a:spAutoFit/>
+          </a:bodyPr>
+          <a:lstStyle/>
+          <a:p>
+            <a:pPr algn="ctr"/>
+            <a:r>
+              <a:rPr lang="en-US" dirty="0"/>
+              <a:t>C</a:t>
+            </a:r>
+          </a:p>
+        </p:txBody>
+      </p:sp>
+      <p:sp>
+        <p:nvSpPr>
+          <p:cNvPr id="40" name="TextBox 39">
+            <a:extLst>
+              <a:ext uri="{FF2B5EF4-FFF2-40B4-BE49-F238E27FC236}">
+                <a16:creationId xmlns:a16="http://schemas.microsoft.com/office/drawing/2014/main" id="{20AAAFF5-0780-D3E9-AAC8-1CD4807C52E2}"/>
+              </a:ext>
+            </a:extLst>
+          </p:cNvPr>
+          <p:cNvSpPr txBox="1"/>
+          <p:nvPr/>
+        </p:nvSpPr>
+        <p:spPr>
+          <a:xfrm>
+            <a:off x="6145210" y="2428069"/>
+            <a:ext cx="646355" cy="369332"/>
+          </a:xfrm>
+          <a:prstGeom prst="rect">
+            <a:avLst/>
+          </a:prstGeom>
+          <a:noFill/>
+        </p:spPr>
+        <p:txBody>
+          <a:bodyPr wrap="square" rtlCol="0">
+            <a:spAutoFit/>
+          </a:bodyPr>
+          <a:lstStyle/>
+          <a:p>
+            <a:pPr algn="ctr"/>
+            <a:r>
+              <a:rPr lang="en-US" dirty="0"/>
+              <a:t>R</a:t>
+            </a:r>
+          </a:p>
+        </p:txBody>
+      </p:sp>
+      <p:sp>
+        <p:nvSpPr>
+          <p:cNvPr id="41" name="TextBox 40">
+            <a:extLst>
+              <a:ext uri="{FF2B5EF4-FFF2-40B4-BE49-F238E27FC236}">
+                <a16:creationId xmlns:a16="http://schemas.microsoft.com/office/drawing/2014/main" id="{04E729DC-E43E-2879-84F5-57A44C117986}"/>
+              </a:ext>
+            </a:extLst>
+          </p:cNvPr>
+          <p:cNvSpPr txBox="1"/>
+          <p:nvPr/>
+        </p:nvSpPr>
+        <p:spPr>
+          <a:xfrm>
+            <a:off x="7132488" y="1930739"/>
+            <a:ext cx="646355" cy="369332"/>
+          </a:xfrm>
+          <a:prstGeom prst="rect">
+            <a:avLst/>
+          </a:prstGeom>
+          <a:noFill/>
+        </p:spPr>
+        <p:txBody>
+          <a:bodyPr wrap="square" rtlCol="0">
+            <a:spAutoFit/>
+          </a:bodyPr>
+          <a:lstStyle/>
+          <a:p>
+            <a:pPr algn="ctr"/>
+            <a:r>
+              <a:rPr lang="en-US" dirty="0"/>
+              <a:t>R</a:t>
+            </a:r>
+          </a:p>
+        </p:txBody>
+      </p:sp>
+      <p:sp>
+        <p:nvSpPr>
+          <p:cNvPr id="43" name="TextBox 42">
+            <a:extLst>
+              <a:ext uri="{FF2B5EF4-FFF2-40B4-BE49-F238E27FC236}">
+                <a16:creationId xmlns:a16="http://schemas.microsoft.com/office/drawing/2014/main" id="{62C86334-66BD-B7CD-D1AD-A780A5F0E20F}"/>
+              </a:ext>
+            </a:extLst>
+          </p:cNvPr>
+          <p:cNvSpPr txBox="1"/>
+          <p:nvPr/>
+        </p:nvSpPr>
+        <p:spPr>
+          <a:xfrm>
+            <a:off x="8200696" y="3003631"/>
+            <a:ext cx="646355" cy="369332"/>
+          </a:xfrm>
+          <a:prstGeom prst="rect">
+            <a:avLst/>
+          </a:prstGeom>
+          <a:noFill/>
+        </p:spPr>
+        <p:txBody>
+          <a:bodyPr wrap="square" rtlCol="0">
+            <a:spAutoFit/>
+          </a:bodyPr>
+          <a:lstStyle/>
+          <a:p>
+            <a:pPr algn="ctr"/>
+            <a:r>
+              <a:rPr lang="en-US" dirty="0" err="1"/>
+              <a:t>Vout</a:t>
+            </a:r>
+            <a:endParaRPr lang="en-US" dirty="0"/>
+          </a:p>
+        </p:txBody>
+      </p:sp>
+      <p:sp>
+        <p:nvSpPr>
+          <p:cNvPr id="51" name="TextBox 50">
+            <a:extLst>
+              <a:ext uri="{FF2B5EF4-FFF2-40B4-BE49-F238E27FC236}">
+                <a16:creationId xmlns:a16="http://schemas.microsoft.com/office/drawing/2014/main" id="{6B1FD51E-BFAF-2545-5152-9DD2C5AFA1A1}"/>
+              </a:ext>
+            </a:extLst>
+          </p:cNvPr>
+          <p:cNvSpPr txBox="1"/>
+          <p:nvPr/>
+        </p:nvSpPr>
+        <p:spPr>
+          <a:xfrm>
+            <a:off x="3317149" y="2515222"/>
+            <a:ext cx="646355" cy="369332"/>
+          </a:xfrm>
+          <a:prstGeom prst="rect">
+            <a:avLst/>
+          </a:prstGeom>
+          <a:noFill/>
+        </p:spPr>
+        <p:txBody>
+          <a:bodyPr wrap="square" rtlCol="0">
+            <a:spAutoFit/>
+          </a:bodyPr>
+          <a:lstStyle/>
+          <a:p>
+            <a:pPr algn="ctr"/>
+            <a:r>
+              <a:rPr lang="en-US" dirty="0"/>
+              <a:t>Vin</a:t>
+            </a:r>
+          </a:p>
+        </p:txBody>
+      </p:sp>
     </p:spTree>
     <p:extLst>
       <p:ext uri="{BB962C8B-B14F-4D97-AF65-F5344CB8AC3E}">

</xml_diff>